<commit_message>
Added annular flux & derivatives for b=0; added some text.
</commit_message>
<xml_diff>
--- a/tex/Circle_overlap_area.pptx
+++ b/tex/Circle_overlap_area.pptx
@@ -3419,8 +3419,8 @@
           </a:xfrm>
           <a:prstGeom prst="pie">
             <a:avLst>
-              <a:gd name="adj1" fmla="val 2555686"/>
-              <a:gd name="adj2" fmla="val 8358820"/>
+              <a:gd name="adj1" fmla="val 2528067"/>
+              <a:gd name="adj2" fmla="val 8256525"/>
             </a:avLst>
           </a:prstGeom>
         </p:spPr>
@@ -3926,12 +3926,17 @@
         </p:nvCxnSpPr>
         <p:spPr>
           <a:xfrm flipV="1">
-            <a:off x="4498154" y="3267635"/>
-            <a:ext cx="643230" cy="959354"/>
+            <a:off x="4521690" y="3223380"/>
+            <a:ext cx="652806" cy="993357"/>
           </a:xfrm>
           <a:prstGeom prst="line">
             <a:avLst/>
           </a:prstGeom>
+          <a:ln w="12700">
+            <a:solidFill>
+              <a:schemeClr val="tx1"/>
+            </a:solidFill>
+          </a:ln>
         </p:spPr>
         <p:style>
           <a:lnRef idx="1">
@@ -4016,13 +4021,13 @@
         </p:nvCxnSpPr>
         <p:spPr>
           <a:xfrm flipV="1">
-            <a:off x="4498154" y="2656003"/>
-            <a:ext cx="0" cy="1577918"/>
+            <a:off x="4516299" y="2633433"/>
+            <a:ext cx="0" cy="1585972"/>
           </a:xfrm>
           <a:prstGeom prst="line">
             <a:avLst/>
           </a:prstGeom>
-          <a:ln>
+          <a:ln w="12700">
             <a:solidFill>
               <a:schemeClr val="tx1"/>
             </a:solidFill>
@@ -4051,7 +4056,7 @@
         </p:nvSpPr>
         <p:spPr>
           <a:xfrm>
-            <a:off x="4222376" y="3512128"/>
+            <a:off x="4144819" y="3198181"/>
             <a:ext cx="336176" cy="369332"/>
           </a:xfrm>
           <a:prstGeom prst="rect">
@@ -4081,8 +4086,8 @@
         </p:nvSpPr>
         <p:spPr>
           <a:xfrm>
-            <a:off x="4501759" y="2831473"/>
-            <a:ext cx="474645" cy="369332"/>
+            <a:off x="4488841" y="2787702"/>
+            <a:ext cx="474645" cy="323165"/>
           </a:xfrm>
           <a:prstGeom prst="rect">
             <a:avLst/>
@@ -4096,14 +4101,14 @@
           <a:lstStyle/>
           <a:p>
             <a:r>
-              <a:rPr lang="en-US" smtClean="0"/>
+              <a:rPr lang="en-US" sz="1500" dirty="0" smtClean="0"/>
               <a:t>𝛋</a:t>
             </a:r>
             <a:r>
-              <a:rPr lang="en-US" baseline="-25000" smtClean="0"/>
+              <a:rPr lang="en-US" sz="1500" baseline="-25000" dirty="0" smtClean="0"/>
               <a:t>0</a:t>
             </a:r>
-            <a:endParaRPr lang="en-US" dirty="0"/>
+            <a:endParaRPr lang="en-US" sz="1500" dirty="0"/>
           </a:p>
         </p:txBody>
       </p:sp>
@@ -4122,8 +4127,8 @@
           </a:xfrm>
           <a:prstGeom prst="arc">
             <a:avLst>
-              <a:gd name="adj1" fmla="val 2387405"/>
-              <a:gd name="adj2" fmla="val 5447272"/>
+              <a:gd name="adj1" fmla="val 2205186"/>
+              <a:gd name="adj2" fmla="val 5457838"/>
             </a:avLst>
           </a:prstGeom>
           <a:ln>
@@ -4163,8 +4168,8 @@
         </p:nvSpPr>
         <p:spPr>
           <a:xfrm>
-            <a:off x="4424576" y="3624610"/>
-            <a:ext cx="474645" cy="369332"/>
+            <a:off x="4430165" y="3667573"/>
+            <a:ext cx="474645" cy="323165"/>
           </a:xfrm>
           <a:prstGeom prst="rect">
             <a:avLst/>
@@ -4178,14 +4183,14 @@
           <a:lstStyle/>
           <a:p>
             <a:r>
-              <a:rPr lang="en-US" dirty="0" smtClean="0"/>
+              <a:rPr lang="en-US" sz="1500" dirty="0" smtClean="0"/>
               <a:t>𝛋</a:t>
             </a:r>
             <a:r>
-              <a:rPr lang="en-US" baseline="-25000" dirty="0"/>
+              <a:rPr lang="en-US" sz="1500" baseline="-25000" dirty="0"/>
               <a:t>1</a:t>
             </a:r>
-            <a:endParaRPr lang="en-US" dirty="0"/>
+            <a:endParaRPr lang="en-US" sz="1500" dirty="0"/>
           </a:p>
         </p:txBody>
       </p:sp>
@@ -4199,13 +4204,13 @@
         </p:nvSpPr>
         <p:spPr>
           <a:xfrm>
-            <a:off x="4282888" y="3980944"/>
+            <a:off x="4301810" y="3988137"/>
             <a:ext cx="456771" cy="457200"/>
           </a:xfrm>
           <a:prstGeom prst="arc">
             <a:avLst>
-              <a:gd name="adj1" fmla="val 16380124"/>
-              <a:gd name="adj2" fmla="val 18512894"/>
+              <a:gd name="adj1" fmla="val 15992184"/>
+              <a:gd name="adj2" fmla="val 18049703"/>
             </a:avLst>
           </a:prstGeom>
           <a:ln>
@@ -4234,6 +4239,44 @@
           <a:p>
             <a:pPr algn="ctr"/>
             <a:endParaRPr lang="en-US"/>
+          </a:p>
+        </p:txBody>
+      </p:sp>
+      <p:sp>
+        <p:nvSpPr>
+          <p:cNvPr id="65" name="Left Brace 64"/>
+          <p:cNvSpPr/>
+          <p:nvPr/>
+        </p:nvSpPr>
+        <p:spPr>
+          <a:xfrm>
+            <a:off x="4383054" y="2640064"/>
+            <a:ext cx="118165" cy="1576673"/>
+          </a:xfrm>
+          <a:prstGeom prst="leftBrace">
+            <a:avLst/>
+          </a:prstGeom>
+        </p:spPr>
+        <p:style>
+          <a:lnRef idx="2">
+            <a:schemeClr val="dk1"/>
+          </a:lnRef>
+          <a:fillRef idx="0">
+            <a:schemeClr val="dk1"/>
+          </a:fillRef>
+          <a:effectRef idx="1">
+            <a:schemeClr val="dk1"/>
+          </a:effectRef>
+          <a:fontRef idx="minor">
+            <a:schemeClr val="tx1"/>
+          </a:fontRef>
+        </p:style>
+        <p:txBody>
+          <a:bodyPr rtlCol="0" anchor="ctr"/>
+          <a:lstStyle/>
+          <a:p>
+            <a:pPr algn="ctr"/>
+            <a:endParaRPr lang="en-US" i="1"/>
           </a:p>
         </p:txBody>
       </p:sp>

</xml_diff>